<commit_message>
Update Plantilla - Educacion.pptx
</commit_message>
<xml_diff>
--- a/Plantilla - Educacion.pptx
+++ b/Plantilla - Educacion.pptx
@@ -5164,14 +5164,14 @@
           <p:nvPr>
             <p:extLst>
               <p:ext uri="{D42A27DB-BD31-4B8C-83A1-F6EECF244321}">
-                <p14:modId xmlns:p14="http://schemas.microsoft.com/office/powerpoint/2010/main" val="2489346824"/>
+                <p14:modId xmlns:p14="http://schemas.microsoft.com/office/powerpoint/2010/main" val="3222222217"/>
               </p:ext>
             </p:extLst>
           </p:nvPr>
         </p:nvGraphicFramePr>
         <p:xfrm>
           <a:off x="326333" y="1501531"/>
-          <a:ext cx="11539334" cy="4944532"/>
+          <a:ext cx="9873372" cy="4944532"/>
         </p:xfrm>
         <a:graphic>
           <a:graphicData uri="http://schemas.openxmlformats.org/drawingml/2006/table">
@@ -5191,13 +5191,6 @@
                   <a:extLst>
                     <a:ext uri="{9D8B030D-6E8A-4147-A177-3AD203B41FA5}">
                       <a16:colId xmlns:a16="http://schemas.microsoft.com/office/drawing/2014/main" val="594195062"/>
-                    </a:ext>
-                  </a:extLst>
-                </a:gridCol>
-                <a:gridCol w="901874">
-                  <a:extLst>
-                    <a:ext uri="{9D8B030D-6E8A-4147-A177-3AD203B41FA5}">
-                      <a16:colId xmlns:a16="http://schemas.microsoft.com/office/drawing/2014/main" val="666123856"/>
                     </a:ext>
                   </a:extLst>
                 </a:gridCol>
@@ -5222,13 +5215,6 @@
                     </a:ext>
                   </a:extLst>
                 </a:gridCol>
-                <a:gridCol w="764088">
-                  <a:extLst>
-                    <a:ext uri="{9D8B030D-6E8A-4147-A177-3AD203B41FA5}">
-                      <a16:colId xmlns:a16="http://schemas.microsoft.com/office/drawing/2014/main" val="3827666896"/>
-                    </a:ext>
-                  </a:extLst>
-                </a:gridCol>
                 <a:gridCol w="1728591">
                   <a:extLst>
                     <a:ext uri="{9D8B030D-6E8A-4147-A177-3AD203B41FA5}">
@@ -5309,7 +5295,7 @@
                         <a:rPr lang="es-PE" sz="1200" b="1" u="none" strike="noStrike" dirty="0">
                           <a:effectLst/>
                         </a:rPr>
-                        <a:t>CÓDIGO DE IDEA</a:t>
+                        <a:t>NOMBRE DEL PROYECTO DE INVERSIÓN</a:t>
                       </a:r>
                       <a:endParaRPr lang="es-PE" sz="1200" b="1" i="0" u="none" strike="noStrike" dirty="0">
                         <a:solidFill>
@@ -5336,7 +5322,7 @@
                         <a:rPr lang="es-PE" sz="1200" b="1" u="none" strike="noStrike" dirty="0">
                           <a:effectLst/>
                         </a:rPr>
-                        <a:t>NOMBRE DEL PROYECTO DE INVERSIÓN</a:t>
+                        <a:t>MONTO DE INVERSIÓN S/</a:t>
                       </a:r>
                       <a:endParaRPr lang="es-PE" sz="1200" b="1" i="0" u="none" strike="noStrike" dirty="0">
                         <a:solidFill>
@@ -5363,7 +5349,7 @@
                         <a:rPr lang="es-PE" sz="1200" b="1" u="none" strike="noStrike" dirty="0">
                           <a:effectLst/>
                         </a:rPr>
-                        <a:t>MONTO DE INVERSIÓN S/</a:t>
+                        <a:t>ESTADO SITUACIONAL</a:t>
                       </a:r>
                       <a:endParaRPr lang="es-PE" sz="1200" b="1" i="0" u="none" strike="noStrike" dirty="0">
                         <a:solidFill>
@@ -5372,57 +5358,6 @@
                         <a:effectLst/>
                         <a:latin typeface="Arial Narrow" panose="020B0606020202030204" pitchFamily="34" charset="0"/>
                       </a:endParaRPr>
-                    </a:p>
-                  </a:txBody>
-                  <a:tcPr marL="6772" marR="6772" marT="6772" marB="0" anchor="ctr">
-                    <a:solidFill>
-                      <a:schemeClr val="accent5"/>
-                    </a:solidFill>
-                  </a:tcPr>
-                </a:tc>
-                <a:tc>
-                  <a:txBody>
-                    <a:bodyPr/>
-                    <a:lstStyle/>
-                    <a:p>
-                      <a:pPr algn="ctr" rtl="0" fontAlgn="ctr"/>
-                      <a:r>
-                        <a:rPr lang="es-PE" sz="1200" b="1" u="none" strike="noStrike" dirty="0">
-                          <a:effectLst/>
-                        </a:rPr>
-                        <a:t>ESTADO SITUACIONAL</a:t>
-                      </a:r>
-                      <a:endParaRPr lang="es-PE" sz="1200" b="1" i="0" u="none" strike="noStrike" dirty="0">
-                        <a:solidFill>
-                          <a:srgbClr val="000000"/>
-                        </a:solidFill>
-                        <a:effectLst/>
-                        <a:latin typeface="Arial Narrow" panose="020B0606020202030204" pitchFamily="34" charset="0"/>
-                      </a:endParaRPr>
-                    </a:p>
-                  </a:txBody>
-                  <a:tcPr marL="6772" marR="6772" marT="6772" marB="0" anchor="ctr">
-                    <a:solidFill>
-                      <a:schemeClr val="accent5"/>
-                    </a:solidFill>
-                  </a:tcPr>
-                </a:tc>
-                <a:tc>
-                  <a:txBody>
-                    <a:bodyPr/>
-                    <a:lstStyle/>
-                    <a:p>
-                      <a:pPr algn="ctr" rtl="0" fontAlgn="ctr"/>
-                      <a:r>
-                        <a:rPr lang="es-PE" sz="1200" b="1" i="0" u="none" strike="noStrike" dirty="0">
-                          <a:solidFill>
-                            <a:srgbClr val="000000"/>
-                          </a:solidFill>
-                          <a:effectLst/>
-                          <a:latin typeface="Arial Narrow" panose="020B0606020202030204" pitchFamily="34" charset="0"/>
-                        </a:rPr>
-                        <a:t>DURACION</a:t>
-                      </a:r>
                     </a:p>
                   </a:txBody>
                   <a:tcPr marL="6772" marR="6772" marT="6772" marB="0" anchor="ctr">
@@ -5533,52 +5468,6 @@
                     <a:bodyPr/>
                     <a:lstStyle/>
                     <a:p>
-                      <a:pPr marL="0" marR="0" lvl="0" indent="0" algn="ctr" defTabSz="914400" rtl="0" eaLnBrk="1" fontAlgn="ctr" latinLnBrk="0" hangingPunct="1">
-                        <a:lnSpc>
-                          <a:spcPct val="100000"/>
-                        </a:lnSpc>
-                        <a:spcBef>
-                          <a:spcPts val="0"/>
-                        </a:spcBef>
-                        <a:spcAft>
-                          <a:spcPts val="0"/>
-                        </a:spcAft>
-                        <a:buClrTx/>
-                        <a:buSzTx/>
-                        <a:buFontTx/>
-                        <a:buNone/>
-                        <a:tabLst/>
-                        <a:defRPr/>
-                      </a:pPr>
-                      <a:r>
-                        <a:rPr lang="es-PE" sz="1000" b="0" i="0" u="none" strike="noStrike" dirty="0">
-                          <a:solidFill>
-                            <a:srgbClr val="000000"/>
-                          </a:solidFill>
-                          <a:effectLst/>
-                          <a:latin typeface="Arial Narrow" panose="020B0606020202030204" pitchFamily="34" charset="0"/>
-                        </a:rPr>
-                        <a:t>----</a:t>
-                      </a:r>
-                    </a:p>
-                    <a:p>
-                      <a:pPr algn="ctr" rtl="0" fontAlgn="ctr"/>
-                      <a:endParaRPr lang="es-PE" sz="1000" b="0" i="0" u="none" strike="noStrike" dirty="0">
-                        <a:solidFill>
-                          <a:srgbClr val="000000"/>
-                        </a:solidFill>
-                        <a:effectLst/>
-                        <a:latin typeface="Arial Narrow" panose="020B0606020202030204" pitchFamily="34" charset="0"/>
-                      </a:endParaRPr>
-                    </a:p>
-                  </a:txBody>
-                  <a:tcPr marL="6772" marR="6772" marT="6772" marB="0" anchor="ctr"/>
-                </a:tc>
-                <a:tc>
-                  <a:txBody>
-                    <a:bodyPr/>
-                    <a:lstStyle/>
-                    <a:p>
                       <a:pPr marL="0" marR="0" lvl="0" indent="0" algn="l" defTabSz="914400" rtl="0" eaLnBrk="1" fontAlgn="auto" latinLnBrk="0" hangingPunct="1">
                         <a:lnSpc>
                           <a:spcPct val="100000"/>
@@ -5681,23 +5570,6 @@
                     </a:p>
                   </a:txBody>
                   <a:tcPr/>
-                </a:tc>
-                <a:tc>
-                  <a:txBody>
-                    <a:bodyPr/>
-                    <a:lstStyle/>
-                    <a:p>
-                      <a:pPr algn="ctr" rtl="0" fontAlgn="ctr"/>
-                      <a:endParaRPr lang="es-PE" sz="1000" b="0" i="0" u="none" strike="noStrike" dirty="0">
-                        <a:solidFill>
-                          <a:srgbClr val="000000"/>
-                        </a:solidFill>
-                        <a:effectLst/>
-                        <a:latin typeface="Arial Narrow" panose="020B0606020202030204" pitchFamily="34" charset="0"/>
-                      </a:endParaRPr>
-                    </a:p>
-                  </a:txBody>
-                  <a:tcPr marL="6772" marR="6772" marT="6772" marB="0" anchor="ctr"/>
                 </a:tc>
                 <a:tc>
                   <a:txBody>
@@ -5856,52 +5728,6 @@
                     <a:bodyPr/>
                     <a:lstStyle/>
                     <a:p>
-                      <a:pPr marL="0" marR="0" lvl="0" indent="0" algn="ctr" defTabSz="914400" rtl="0" eaLnBrk="1" fontAlgn="ctr" latinLnBrk="0" hangingPunct="1">
-                        <a:lnSpc>
-                          <a:spcPct val="100000"/>
-                        </a:lnSpc>
-                        <a:spcBef>
-                          <a:spcPts val="0"/>
-                        </a:spcBef>
-                        <a:spcAft>
-                          <a:spcPts val="0"/>
-                        </a:spcAft>
-                        <a:buClrTx/>
-                        <a:buSzTx/>
-                        <a:buFontTx/>
-                        <a:buNone/>
-                        <a:tabLst/>
-                        <a:defRPr/>
-                      </a:pPr>
-                      <a:r>
-                        <a:rPr lang="es-PE" sz="1000" b="0" i="0" u="none" strike="noStrike" dirty="0">
-                          <a:solidFill>
-                            <a:srgbClr val="000000"/>
-                          </a:solidFill>
-                          <a:effectLst/>
-                          <a:latin typeface="Arial Narrow" panose="020B0606020202030204" pitchFamily="34" charset="0"/>
-                        </a:rPr>
-                        <a:t>----</a:t>
-                      </a:r>
-                    </a:p>
-                    <a:p>
-                      <a:pPr algn="ctr" rtl="0" fontAlgn="ctr"/>
-                      <a:endParaRPr lang="es-PE" sz="1000" b="0" i="0" u="none" strike="noStrike" dirty="0">
-                        <a:solidFill>
-                          <a:srgbClr val="000000"/>
-                        </a:solidFill>
-                        <a:effectLst/>
-                        <a:latin typeface="Arial Narrow" panose="020B0606020202030204" pitchFamily="34" charset="0"/>
-                      </a:endParaRPr>
-                    </a:p>
-                  </a:txBody>
-                  <a:tcPr marL="6772" marR="6772" marT="6772" marB="0" anchor="ctr"/>
-                </a:tc>
-                <a:tc>
-                  <a:txBody>
-                    <a:bodyPr/>
-                    <a:lstStyle/>
-                    <a:p>
                       <a:pPr marL="0" marR="0" lvl="0" indent="0" algn="l" defTabSz="914400" rtl="0" eaLnBrk="1" fontAlgn="auto" latinLnBrk="0" hangingPunct="1">
                         <a:lnSpc>
                           <a:spcPct val="100000"/>
@@ -6011,23 +5837,6 @@
                     </a:p>
                   </a:txBody>
                   <a:tcPr/>
-                </a:tc>
-                <a:tc>
-                  <a:txBody>
-                    <a:bodyPr/>
-                    <a:lstStyle/>
-                    <a:p>
-                      <a:pPr algn="ctr" rtl="0" fontAlgn="ctr"/>
-                      <a:endParaRPr lang="es-PE" sz="1000" b="0" i="0" u="none" strike="noStrike" dirty="0">
-                        <a:solidFill>
-                          <a:srgbClr val="000000"/>
-                        </a:solidFill>
-                        <a:effectLst/>
-                        <a:latin typeface="Arial Narrow" panose="020B0606020202030204" pitchFamily="34" charset="0"/>
-                      </a:endParaRPr>
-                    </a:p>
-                  </a:txBody>
-                  <a:tcPr marL="6772" marR="6772" marT="6772" marB="0" anchor="ctr"/>
                 </a:tc>
                 <a:tc>
                   <a:txBody>
@@ -6184,52 +5993,6 @@
                     <a:bodyPr/>
                     <a:lstStyle/>
                     <a:p>
-                      <a:pPr marL="0" marR="0" lvl="0" indent="0" algn="ctr" defTabSz="914400" rtl="0" eaLnBrk="1" fontAlgn="ctr" latinLnBrk="0" hangingPunct="1">
-                        <a:lnSpc>
-                          <a:spcPct val="100000"/>
-                        </a:lnSpc>
-                        <a:spcBef>
-                          <a:spcPts val="0"/>
-                        </a:spcBef>
-                        <a:spcAft>
-                          <a:spcPts val="0"/>
-                        </a:spcAft>
-                        <a:buClrTx/>
-                        <a:buSzTx/>
-                        <a:buFontTx/>
-                        <a:buNone/>
-                        <a:tabLst/>
-                        <a:defRPr/>
-                      </a:pPr>
-                      <a:r>
-                        <a:rPr lang="es-PE" sz="1000" b="0" i="0" u="none" strike="noStrike" dirty="0">
-                          <a:solidFill>
-                            <a:srgbClr val="000000"/>
-                          </a:solidFill>
-                          <a:effectLst/>
-                          <a:latin typeface="Arial Narrow" panose="020B0606020202030204" pitchFamily="34" charset="0"/>
-                        </a:rPr>
-                        <a:t>----</a:t>
-                      </a:r>
-                    </a:p>
-                    <a:p>
-                      <a:pPr algn="ctr" rtl="0" fontAlgn="ctr"/>
-                      <a:endParaRPr lang="es-PE" sz="1000" b="0" i="0" u="none" strike="noStrike" dirty="0">
-                        <a:solidFill>
-                          <a:srgbClr val="000000"/>
-                        </a:solidFill>
-                        <a:effectLst/>
-                        <a:latin typeface="Arial Narrow" panose="020B0606020202030204" pitchFamily="34" charset="0"/>
-                      </a:endParaRPr>
-                    </a:p>
-                  </a:txBody>
-                  <a:tcPr marL="6772" marR="6772" marT="6772" marB="0" anchor="ctr"/>
-                </a:tc>
-                <a:tc>
-                  <a:txBody>
-                    <a:bodyPr/>
-                    <a:lstStyle/>
-                    <a:p>
                       <a:r>
                         <a:rPr lang="es-PE" sz="1000" b="0" i="0" u="none" strike="noStrike" cap="none" dirty="0">
                           <a:solidFill>
@@ -6301,23 +6064,6 @@
                     </a:p>
                   </a:txBody>
                   <a:tcPr/>
-                </a:tc>
-                <a:tc>
-                  <a:txBody>
-                    <a:bodyPr/>
-                    <a:lstStyle/>
-                    <a:p>
-                      <a:pPr algn="ctr" rtl="0" fontAlgn="ctr"/>
-                      <a:endParaRPr lang="es-PE" sz="1000" b="0" i="0" u="none" strike="noStrike" dirty="0">
-                        <a:solidFill>
-                          <a:srgbClr val="000000"/>
-                        </a:solidFill>
-                        <a:effectLst/>
-                        <a:latin typeface="Arial Narrow" panose="020B0606020202030204" pitchFamily="34" charset="0"/>
-                      </a:endParaRPr>
-                    </a:p>
-                  </a:txBody>
-                  <a:tcPr marL="6772" marR="6772" marT="6772" marB="0" anchor="ctr"/>
                 </a:tc>
                 <a:tc>
                   <a:txBody>
@@ -6444,52 +6190,6 @@
                     <a:bodyPr/>
                     <a:lstStyle/>
                     <a:p>
-                      <a:pPr marL="0" marR="0" lvl="0" indent="0" algn="ctr" defTabSz="914400" rtl="0" eaLnBrk="1" fontAlgn="ctr" latinLnBrk="0" hangingPunct="1">
-                        <a:lnSpc>
-                          <a:spcPct val="100000"/>
-                        </a:lnSpc>
-                        <a:spcBef>
-                          <a:spcPts val="0"/>
-                        </a:spcBef>
-                        <a:spcAft>
-                          <a:spcPts val="0"/>
-                        </a:spcAft>
-                        <a:buClrTx/>
-                        <a:buSzTx/>
-                        <a:buFontTx/>
-                        <a:buNone/>
-                        <a:tabLst/>
-                        <a:defRPr/>
-                      </a:pPr>
-                      <a:r>
-                        <a:rPr lang="es-PE" sz="1000" b="0" i="0" u="none" strike="noStrike" dirty="0">
-                          <a:solidFill>
-                            <a:srgbClr val="000000"/>
-                          </a:solidFill>
-                          <a:effectLst/>
-                          <a:latin typeface="Arial Narrow" panose="020B0606020202030204" pitchFamily="34" charset="0"/>
-                        </a:rPr>
-                        <a:t>----</a:t>
-                      </a:r>
-                    </a:p>
-                    <a:p>
-                      <a:pPr algn="ctr" rtl="0" fontAlgn="ctr"/>
-                      <a:endParaRPr lang="es-PE" sz="1000" b="0" i="0" u="none" strike="noStrike" dirty="0">
-                        <a:solidFill>
-                          <a:srgbClr val="000000"/>
-                        </a:solidFill>
-                        <a:effectLst/>
-                        <a:latin typeface="Arial Narrow" panose="020B0606020202030204" pitchFamily="34" charset="0"/>
-                      </a:endParaRPr>
-                    </a:p>
-                  </a:txBody>
-                  <a:tcPr marL="6772" marR="6772" marT="6772" marB="0" anchor="ctr"/>
-                </a:tc>
-                <a:tc>
-                  <a:txBody>
-                    <a:bodyPr/>
-                    <a:lstStyle/>
-                    <a:p>
                       <a:r>
                         <a:rPr lang="es-PE" sz="1000" b="0" i="0" u="none" strike="noStrike" cap="none" dirty="0">
                           <a:solidFill>
@@ -6561,23 +6261,6 @@
                     </a:p>
                   </a:txBody>
                   <a:tcPr/>
-                </a:tc>
-                <a:tc>
-                  <a:txBody>
-                    <a:bodyPr/>
-                    <a:lstStyle/>
-                    <a:p>
-                      <a:pPr algn="ctr" rtl="0" fontAlgn="ctr"/>
-                      <a:endParaRPr lang="es-PE" sz="1000" b="0" i="0" u="none" strike="noStrike" dirty="0">
-                        <a:solidFill>
-                          <a:srgbClr val="000000"/>
-                        </a:solidFill>
-                        <a:effectLst/>
-                        <a:latin typeface="Arial Narrow" panose="020B0606020202030204" pitchFamily="34" charset="0"/>
-                      </a:endParaRPr>
-                    </a:p>
-                  </a:txBody>
-                  <a:tcPr marL="6772" marR="6772" marT="6772" marB="0" anchor="ctr"/>
                 </a:tc>
                 <a:tc>
                   <a:txBody>
@@ -6752,52 +6435,6 @@
                     <a:bodyPr/>
                     <a:lstStyle/>
                     <a:p>
-                      <a:pPr marL="0" marR="0" lvl="0" indent="0" algn="ctr" defTabSz="914400" rtl="0" eaLnBrk="1" fontAlgn="ctr" latinLnBrk="0" hangingPunct="1">
-                        <a:lnSpc>
-                          <a:spcPct val="100000"/>
-                        </a:lnSpc>
-                        <a:spcBef>
-                          <a:spcPts val="0"/>
-                        </a:spcBef>
-                        <a:spcAft>
-                          <a:spcPts val="0"/>
-                        </a:spcAft>
-                        <a:buClrTx/>
-                        <a:buSzTx/>
-                        <a:buFontTx/>
-                        <a:buNone/>
-                        <a:tabLst/>
-                        <a:defRPr/>
-                      </a:pPr>
-                      <a:r>
-                        <a:rPr lang="es-PE" sz="1000" b="0" i="0" u="none" strike="noStrike" dirty="0">
-                          <a:solidFill>
-                            <a:srgbClr val="000000"/>
-                          </a:solidFill>
-                          <a:effectLst/>
-                          <a:latin typeface="Arial Narrow" panose="020B0606020202030204" pitchFamily="34" charset="0"/>
-                        </a:rPr>
-                        <a:t>----</a:t>
-                      </a:r>
-                    </a:p>
-                    <a:p>
-                      <a:pPr algn="ctr" rtl="0" fontAlgn="ctr"/>
-                      <a:endParaRPr lang="es-PE" sz="1000" b="0" i="0" u="none" strike="noStrike" dirty="0">
-                        <a:solidFill>
-                          <a:srgbClr val="000000"/>
-                        </a:solidFill>
-                        <a:effectLst/>
-                        <a:latin typeface="Arial Narrow" panose="020B0606020202030204" pitchFamily="34" charset="0"/>
-                      </a:endParaRPr>
-                    </a:p>
-                  </a:txBody>
-                  <a:tcPr marL="6772" marR="6772" marT="6772" marB="0" anchor="ctr"/>
-                </a:tc>
-                <a:tc>
-                  <a:txBody>
-                    <a:bodyPr/>
-                    <a:lstStyle/>
-                    <a:p>
                       <a:r>
                         <a:rPr lang="es-PE" sz="1000" b="0" i="0" u="none" strike="noStrike" cap="none" dirty="0">
                           <a:solidFill>
@@ -6869,23 +6506,6 @@
                     </a:p>
                   </a:txBody>
                   <a:tcPr/>
-                </a:tc>
-                <a:tc>
-                  <a:txBody>
-                    <a:bodyPr/>
-                    <a:lstStyle/>
-                    <a:p>
-                      <a:pPr algn="ctr" rtl="0" fontAlgn="ctr"/>
-                      <a:endParaRPr lang="es-PE" sz="1000" b="0" i="0" u="none" strike="noStrike" dirty="0">
-                        <a:solidFill>
-                          <a:srgbClr val="000000"/>
-                        </a:solidFill>
-                        <a:effectLst/>
-                        <a:latin typeface="Arial Narrow" panose="020B0606020202030204" pitchFamily="34" charset="0"/>
-                      </a:endParaRPr>
-                    </a:p>
-                  </a:txBody>
-                  <a:tcPr marL="6772" marR="6772" marT="6772" marB="0" anchor="ctr"/>
                 </a:tc>
                 <a:tc>
                   <a:txBody>
@@ -7011,52 +6631,6 @@
                     <a:bodyPr/>
                     <a:lstStyle/>
                     <a:p>
-                      <a:pPr marL="0" marR="0" lvl="0" indent="0" algn="ctr" defTabSz="914400" rtl="0" eaLnBrk="1" fontAlgn="ctr" latinLnBrk="0" hangingPunct="1">
-                        <a:lnSpc>
-                          <a:spcPct val="100000"/>
-                        </a:lnSpc>
-                        <a:spcBef>
-                          <a:spcPts val="0"/>
-                        </a:spcBef>
-                        <a:spcAft>
-                          <a:spcPts val="0"/>
-                        </a:spcAft>
-                        <a:buClrTx/>
-                        <a:buSzTx/>
-                        <a:buFontTx/>
-                        <a:buNone/>
-                        <a:tabLst/>
-                        <a:defRPr/>
-                      </a:pPr>
-                      <a:r>
-                        <a:rPr lang="es-PE" sz="1000" b="0" i="0" u="none" strike="noStrike" dirty="0">
-                          <a:solidFill>
-                            <a:srgbClr val="000000"/>
-                          </a:solidFill>
-                          <a:effectLst/>
-                          <a:latin typeface="Arial Narrow" panose="020B0606020202030204" pitchFamily="34" charset="0"/>
-                        </a:rPr>
-                        <a:t>----</a:t>
-                      </a:r>
-                    </a:p>
-                    <a:p>
-                      <a:pPr algn="ctr" rtl="0" fontAlgn="ctr"/>
-                      <a:endParaRPr lang="es-PE" sz="1000" b="0" i="0" u="none" strike="noStrike" dirty="0">
-                        <a:solidFill>
-                          <a:srgbClr val="000000"/>
-                        </a:solidFill>
-                        <a:effectLst/>
-                        <a:latin typeface="Arial Narrow" panose="020B0606020202030204" pitchFamily="34" charset="0"/>
-                      </a:endParaRPr>
-                    </a:p>
-                  </a:txBody>
-                  <a:tcPr marL="6772" marR="6772" marT="6772" marB="0" anchor="ctr"/>
-                </a:tc>
-                <a:tc>
-                  <a:txBody>
-                    <a:bodyPr/>
-                    <a:lstStyle/>
-                    <a:p>
                       <a:r>
                         <a:rPr lang="es-PE" sz="1000" b="0" i="0" u="none" strike="noStrike" cap="none" dirty="0">
                           <a:solidFill>
@@ -7128,23 +6702,6 @@
                     </a:p>
                   </a:txBody>
                   <a:tcPr/>
-                </a:tc>
-                <a:tc>
-                  <a:txBody>
-                    <a:bodyPr/>
-                    <a:lstStyle/>
-                    <a:p>
-                      <a:pPr algn="ctr" rtl="0" fontAlgn="ctr"/>
-                      <a:endParaRPr lang="es-PE" sz="1000" b="0" i="0" u="none" strike="noStrike" dirty="0">
-                        <a:solidFill>
-                          <a:srgbClr val="000000"/>
-                        </a:solidFill>
-                        <a:effectLst/>
-                        <a:latin typeface="Arial Narrow" panose="020B0606020202030204" pitchFamily="34" charset="0"/>
-                      </a:endParaRPr>
-                    </a:p>
-                  </a:txBody>
-                  <a:tcPr marL="6772" marR="6772" marT="6772" marB="0" anchor="ctr"/>
                 </a:tc>
                 <a:tc>
                   <a:txBody>
@@ -7644,14 +7201,14 @@
           <p:nvPr>
             <p:extLst>
               <p:ext uri="{D42A27DB-BD31-4B8C-83A1-F6EECF244321}">
-                <p14:modId xmlns:p14="http://schemas.microsoft.com/office/powerpoint/2010/main" val="2507926243"/>
+                <p14:modId xmlns:p14="http://schemas.microsoft.com/office/powerpoint/2010/main" val="3475401868"/>
               </p:ext>
             </p:extLst>
           </p:nvPr>
         </p:nvGraphicFramePr>
         <p:xfrm>
           <a:off x="265958" y="1301115"/>
-          <a:ext cx="11773087" cy="5383463"/>
+          <a:ext cx="10529211" cy="5383463"/>
         </p:xfrm>
         <a:graphic>
           <a:graphicData uri="http://schemas.openxmlformats.org/drawingml/2006/table">
@@ -7667,24 +7224,10 @@
                     </a:ext>
                   </a:extLst>
                 </a:gridCol>
-                <a:gridCol w="504872">
-                  <a:extLst>
-                    <a:ext uri="{9D8B030D-6E8A-4147-A177-3AD203B41FA5}">
-                      <a16:colId xmlns:a16="http://schemas.microsoft.com/office/drawing/2014/main" val="3265136901"/>
-                    </a:ext>
-                  </a:extLst>
-                </a:gridCol>
                 <a:gridCol w="804970">
                   <a:extLst>
                     <a:ext uri="{9D8B030D-6E8A-4147-A177-3AD203B41FA5}">
                       <a16:colId xmlns:a16="http://schemas.microsoft.com/office/drawing/2014/main" val="541476674"/>
-                    </a:ext>
-                  </a:extLst>
-                </a:gridCol>
-                <a:gridCol w="739004">
-                  <a:extLst>
-                    <a:ext uri="{9D8B030D-6E8A-4147-A177-3AD203B41FA5}">
-                      <a16:colId xmlns:a16="http://schemas.microsoft.com/office/drawing/2014/main" val="2809815218"/>
                     </a:ext>
                   </a:extLst>
                 </a:gridCol>
@@ -7769,61 +7312,7 @@
                         <a:rPr lang="es-PE" sz="1100" b="1" u="none" strike="noStrike" dirty="0">
                           <a:effectLst/>
                         </a:rPr>
-                        <a:t>CUI</a:t>
-                      </a:r>
-                      <a:endParaRPr lang="es-PE" sz="1100" b="1" i="0" u="none" strike="noStrike" dirty="0">
-                        <a:solidFill>
-                          <a:srgbClr val="000000"/>
-                        </a:solidFill>
-                        <a:effectLst/>
-                        <a:latin typeface="Arial Narrow" panose="020B0606020202030204" pitchFamily="34" charset="0"/>
-                      </a:endParaRPr>
-                    </a:p>
-                  </a:txBody>
-                  <a:tcPr marL="6772" marR="6772" marT="6772" marB="0" anchor="ctr">
-                    <a:solidFill>
-                      <a:schemeClr val="accent5"/>
-                    </a:solidFill>
-                  </a:tcPr>
-                </a:tc>
-                <a:tc>
-                  <a:txBody>
-                    <a:bodyPr/>
-                    <a:lstStyle/>
-                    <a:p>
-                      <a:pPr algn="ctr" rtl="0" fontAlgn="ctr"/>
-                      <a:r>
-                        <a:rPr lang="es-PE" sz="1100" b="1" u="none" strike="noStrike" dirty="0">
-                          <a:effectLst/>
-                        </a:rPr>
                         <a:t>CÓDIGO DE IDEA</a:t>
-                      </a:r>
-                      <a:endParaRPr lang="es-PE" sz="1100" b="1" i="0" u="none" strike="noStrike" dirty="0">
-                        <a:solidFill>
-                          <a:srgbClr val="000000"/>
-                        </a:solidFill>
-                        <a:effectLst/>
-                        <a:latin typeface="Arial Narrow" panose="020B0606020202030204" pitchFamily="34" charset="0"/>
-                      </a:endParaRPr>
-                    </a:p>
-                  </a:txBody>
-                  <a:tcPr marL="6772" marR="6772" marT="6772" marB="0" anchor="ctr">
-                    <a:solidFill>
-                      <a:schemeClr val="accent5"/>
-                    </a:solidFill>
-                  </a:tcPr>
-                </a:tc>
-                <a:tc>
-                  <a:txBody>
-                    <a:bodyPr/>
-                    <a:lstStyle/>
-                    <a:p>
-                      <a:pPr algn="ctr" rtl="0" fontAlgn="ctr"/>
-                      <a:r>
-                        <a:rPr lang="es-PE" sz="1100" b="1" u="none" strike="noStrike" dirty="0">
-                          <a:effectLst/>
-                        </a:rPr>
-                        <a:t>FUNCIÓN</a:t>
                       </a:r>
                       <a:endParaRPr lang="es-PE" sz="1100" b="1" i="0" u="none" strike="noStrike" dirty="0">
                         <a:solidFill>
@@ -8057,61 +7546,8 @@
                           <a:effectLst/>
                           <a:latin typeface="Arial Narrow" panose="020B0606020202030204" pitchFamily="34" charset="0"/>
                         </a:rPr>
-                        <a:t>----</a:t>
-                      </a:r>
-                    </a:p>
-                  </a:txBody>
-                  <a:tcPr marL="6772" marR="6772" marT="6772" marB="0" anchor="ctr"/>
-                </a:tc>
-                <a:tc>
-                  <a:txBody>
-                    <a:bodyPr/>
-                    <a:lstStyle/>
-                    <a:p>
-                      <a:pPr algn="ctr" rtl="0" fontAlgn="ctr"/>
-                      <a:r>
-                        <a:rPr lang="es-PE" sz="1000" b="0" i="0" u="none" strike="noStrike" dirty="0">
-                          <a:solidFill>
-                            <a:srgbClr val="000000"/>
-                          </a:solidFill>
-                          <a:effectLst/>
-                          <a:latin typeface="Arial Narrow" panose="020B0606020202030204" pitchFamily="34" charset="0"/>
-                        </a:rPr>
                         <a:t>49265</a:t>
                       </a:r>
-                    </a:p>
-                  </a:txBody>
-                  <a:tcPr marL="6772" marR="6772" marT="6772" marB="0" anchor="ctr"/>
-                </a:tc>
-                <a:tc>
-                  <a:txBody>
-                    <a:bodyPr/>
-                    <a:lstStyle/>
-                    <a:p>
-                      <a:pPr algn="l" rtl="0" fontAlgn="ctr"/>
-                      <a:r>
-                        <a:rPr lang="es-PE" sz="1000" b="0" i="0" u="none" strike="noStrike" dirty="0" err="1">
-                          <a:solidFill>
-                            <a:srgbClr val="000000"/>
-                          </a:solidFill>
-                          <a:effectLst/>
-                          <a:highlight>
-                            <a:srgbClr val="FF0000"/>
-                          </a:highlight>
-                          <a:latin typeface="Arial Narrow" panose="020B0606020202030204" pitchFamily="34" charset="0"/>
-                        </a:rPr>
-                        <a:t>Educacion</a:t>
-                      </a:r>
-                      <a:endParaRPr lang="es-PE" sz="1000" b="0" i="0" u="none" strike="noStrike" dirty="0">
-                        <a:solidFill>
-                          <a:srgbClr val="000000"/>
-                        </a:solidFill>
-                        <a:effectLst/>
-                        <a:highlight>
-                          <a:srgbClr val="FF0000"/>
-                        </a:highlight>
-                        <a:latin typeface="Arial Narrow" panose="020B0606020202030204" pitchFamily="34" charset="0"/>
-                      </a:endParaRPr>
                     </a:p>
                   </a:txBody>
                   <a:tcPr marL="6772" marR="6772" marT="6772" marB="0" anchor="ctr"/>
@@ -8466,13 +7902,6 @@
                         <a:t>2284093</a:t>
                       </a:r>
                     </a:p>
-                  </a:txBody>
-                  <a:tcPr marL="6772" marR="6772" marT="6772" marB="0" anchor="ctr"/>
-                </a:tc>
-                <a:tc>
-                  <a:txBody>
-                    <a:bodyPr/>
-                    <a:lstStyle/>
                     <a:p>
                       <a:pPr algn="ctr" rtl="0" fontAlgn="ctr"/>
                       <a:endParaRPr lang="es-PE" sz="1000" b="0" i="0" u="none" strike="noStrike" dirty="0">
@@ -8480,68 +7909,6 @@
                           <a:srgbClr val="000000"/>
                         </a:solidFill>
                         <a:effectLst/>
-                        <a:latin typeface="Arial Narrow" panose="020B0606020202030204" pitchFamily="34" charset="0"/>
-                      </a:endParaRPr>
-                    </a:p>
-                  </a:txBody>
-                  <a:tcPr marL="6772" marR="6772" marT="6772" marB="0" anchor="ctr"/>
-                </a:tc>
-                <a:tc>
-                  <a:txBody>
-                    <a:bodyPr/>
-                    <a:lstStyle/>
-                    <a:p>
-                      <a:pPr marL="0" marR="0" lvl="0" indent="0" algn="l" defTabSz="914400" rtl="0" eaLnBrk="1" fontAlgn="ctr" latinLnBrk="0" hangingPunct="1">
-                        <a:lnSpc>
-                          <a:spcPct val="100000"/>
-                        </a:lnSpc>
-                        <a:spcBef>
-                          <a:spcPts val="0"/>
-                        </a:spcBef>
-                        <a:spcAft>
-                          <a:spcPts val="0"/>
-                        </a:spcAft>
-                        <a:buClrTx/>
-                        <a:buSzTx/>
-                        <a:buFontTx/>
-                        <a:buNone/>
-                        <a:tabLst/>
-                        <a:defRPr/>
-                      </a:pPr>
-                      <a:r>
-                        <a:rPr lang="es-PE" sz="1000" b="0" i="0" u="none" strike="noStrike" dirty="0" err="1">
-                          <a:solidFill>
-                            <a:srgbClr val="000000"/>
-                          </a:solidFill>
-                          <a:effectLst/>
-                          <a:highlight>
-                            <a:srgbClr val="FF0000"/>
-                          </a:highlight>
-                          <a:latin typeface="Arial Narrow" panose="020B0606020202030204" pitchFamily="34" charset="0"/>
-                        </a:rPr>
-                        <a:t>Educacion</a:t>
-                      </a:r>
-                      <a:endParaRPr lang="es-PE" sz="1000" b="0" i="0" u="none" strike="noStrike" dirty="0">
-                        <a:solidFill>
-                          <a:srgbClr val="000000"/>
-                        </a:solidFill>
-                        <a:effectLst/>
-                        <a:highlight>
-                          <a:srgbClr val="FF0000"/>
-                        </a:highlight>
-                        <a:latin typeface="Arial Narrow" panose="020B0606020202030204" pitchFamily="34" charset="0"/>
-                      </a:endParaRPr>
-                    </a:p>
-                    <a:p>
-                      <a:pPr algn="l" rtl="0" fontAlgn="ctr"/>
-                      <a:endParaRPr lang="es-PE" sz="1000" b="0" i="0" u="none" strike="noStrike" dirty="0">
-                        <a:solidFill>
-                          <a:srgbClr val="000000"/>
-                        </a:solidFill>
-                        <a:effectLst/>
-                        <a:highlight>
-                          <a:srgbClr val="FF0000"/>
-                        </a:highlight>
                         <a:latin typeface="Arial Narrow" panose="020B0606020202030204" pitchFamily="34" charset="0"/>
                       </a:endParaRPr>
                     </a:p>
@@ -8923,23 +8290,7 @@
                     <a:bodyPr/>
                     <a:lstStyle/>
                     <a:p>
-                      <a:pPr marL="0" marR="0" lvl="0" indent="0" algn="ctr" defTabSz="914400" rtl="0" eaLnBrk="1" fontAlgn="ctr" latinLnBrk="0" hangingPunct="1">
-                        <a:lnSpc>
-                          <a:spcPct val="100000"/>
-                        </a:lnSpc>
-                        <a:spcBef>
-                          <a:spcPts val="0"/>
-                        </a:spcBef>
-                        <a:spcAft>
-                          <a:spcPts val="0"/>
-                        </a:spcAft>
-                        <a:buClrTx/>
-                        <a:buSzTx/>
-                        <a:buFontTx/>
-                        <a:buNone/>
-                        <a:tabLst/>
-                        <a:defRPr/>
-                      </a:pPr>
+                      <a:pPr algn="ctr" rtl="0" fontAlgn="ctr"/>
                       <a:r>
                         <a:rPr lang="es-PE" sz="1000" b="0" i="0" u="none" strike="noStrike" dirty="0">
                           <a:solidFill>
@@ -8948,100 +8299,8 @@
                           <a:effectLst/>
                           <a:latin typeface="Arial Narrow" panose="020B0606020202030204" pitchFamily="34" charset="0"/>
                         </a:rPr>
-                        <a:t>----</a:t>
-                      </a:r>
-                    </a:p>
-                    <a:p>
-                      <a:pPr algn="ctr" rtl="0" fontAlgn="ctr"/>
-                      <a:endParaRPr lang="es-PE" sz="1000" b="0" i="0" u="none" strike="noStrike" dirty="0">
-                        <a:solidFill>
-                          <a:srgbClr val="000000"/>
-                        </a:solidFill>
-                        <a:effectLst/>
-                        <a:latin typeface="Arial Narrow" panose="020B0606020202030204" pitchFamily="34" charset="0"/>
-                      </a:endParaRPr>
-                    </a:p>
-                  </a:txBody>
-                  <a:tcPr marL="6772" marR="6772" marT="6772" marB="0" anchor="ctr"/>
-                </a:tc>
-                <a:tc>
-                  <a:txBody>
-                    <a:bodyPr/>
-                    <a:lstStyle/>
-                    <a:p>
-                      <a:pPr algn="ctr" rtl="0" fontAlgn="ctr"/>
-                      <a:r>
-                        <a:rPr lang="es-PE" sz="1000" b="0" i="0" u="none" strike="noStrike" dirty="0">
-                          <a:solidFill>
-                            <a:srgbClr val="000000"/>
-                          </a:solidFill>
-                          <a:effectLst/>
-                          <a:latin typeface="Arial Narrow" panose="020B0606020202030204" pitchFamily="34" charset="0"/>
-                        </a:rPr>
                         <a:t>108724</a:t>
                       </a:r>
-                    </a:p>
-                  </a:txBody>
-                  <a:tcPr marL="6772" marR="6772" marT="6772" marB="0" anchor="ctr"/>
-                </a:tc>
-                <a:tc>
-                  <a:txBody>
-                    <a:bodyPr/>
-                    <a:lstStyle/>
-                    <a:p>
-                      <a:pPr marL="0" marR="0" lvl="0" indent="0" algn="l" defTabSz="914400" rtl="0" eaLnBrk="1" fontAlgn="ctr" latinLnBrk="0" hangingPunct="1">
-                        <a:lnSpc>
-                          <a:spcPct val="100000"/>
-                        </a:lnSpc>
-                        <a:spcBef>
-                          <a:spcPts val="0"/>
-                        </a:spcBef>
-                        <a:spcAft>
-                          <a:spcPts val="0"/>
-                        </a:spcAft>
-                        <a:buClrTx/>
-                        <a:buSzTx/>
-                        <a:buFontTx/>
-                        <a:buNone/>
-                        <a:tabLst/>
-                        <a:defRPr/>
-                      </a:pPr>
-                      <a:r>
-                        <a:rPr lang="es-PE" sz="1000" b="0" i="0" u="none" strike="noStrike" dirty="0" err="1">
-                          <a:solidFill>
-                            <a:srgbClr val="000000"/>
-                          </a:solidFill>
-                          <a:effectLst/>
-                          <a:highlight>
-                            <a:srgbClr val="FF0000"/>
-                          </a:highlight>
-                          <a:latin typeface="Arial Narrow" panose="020B0606020202030204" pitchFamily="34" charset="0"/>
-                        </a:rPr>
-                        <a:t>Educacion</a:t>
-                      </a:r>
-                      <a:endParaRPr lang="es-PE" sz="1000" b="0" i="0" u="none" strike="noStrike" dirty="0">
-                        <a:solidFill>
-                          <a:srgbClr val="000000"/>
-                        </a:solidFill>
-                        <a:effectLst/>
-                        <a:highlight>
-                          <a:srgbClr val="FF0000"/>
-                        </a:highlight>
-                        <a:latin typeface="Arial Narrow" panose="020B0606020202030204" pitchFamily="34" charset="0"/>
-                      </a:endParaRPr>
-                    </a:p>
-                    <a:p>
-                      <a:pPr algn="l" rtl="0" fontAlgn="ctr"/>
-                      <a:endParaRPr lang="es-PE" sz="1000" b="0" i="0" u="none" strike="noStrike" dirty="0">
-                        <a:solidFill>
-                          <a:srgbClr val="000000"/>
-                        </a:solidFill>
-                        <a:effectLst/>
-                        <a:highlight>
-                          <a:srgbClr val="FF0000"/>
-                        </a:highlight>
-                        <a:latin typeface="Arial Narrow" panose="020B0606020202030204" pitchFamily="34" charset="0"/>
-                      </a:endParaRPr>
                     </a:p>
                   </a:txBody>
                   <a:tcPr marL="6772" marR="6772" marT="6772" marB="0" anchor="ctr"/>
@@ -9276,23 +8535,7 @@
                     <a:bodyPr/>
                     <a:lstStyle/>
                     <a:p>
-                      <a:pPr marL="0" marR="0" lvl="0" indent="0" algn="ctr" defTabSz="914400" rtl="0" eaLnBrk="1" fontAlgn="ctr" latinLnBrk="0" hangingPunct="1">
-                        <a:lnSpc>
-                          <a:spcPct val="100000"/>
-                        </a:lnSpc>
-                        <a:spcBef>
-                          <a:spcPts val="0"/>
-                        </a:spcBef>
-                        <a:spcAft>
-                          <a:spcPts val="0"/>
-                        </a:spcAft>
-                        <a:buClrTx/>
-                        <a:buSzTx/>
-                        <a:buFontTx/>
-                        <a:buNone/>
-                        <a:tabLst/>
-                        <a:defRPr/>
-                      </a:pPr>
+                      <a:pPr algn="ctr" rtl="0" fontAlgn="ctr"/>
                       <a:r>
                         <a:rPr lang="es-PE" sz="1000" b="0" i="0" u="none" strike="noStrike" dirty="0">
                           <a:solidFill>
@@ -9301,100 +8544,8 @@
                           <a:effectLst/>
                           <a:latin typeface="Arial Narrow" panose="020B0606020202030204" pitchFamily="34" charset="0"/>
                         </a:rPr>
-                        <a:t>----</a:t>
-                      </a:r>
-                    </a:p>
-                    <a:p>
-                      <a:pPr algn="ctr" rtl="0" fontAlgn="ctr"/>
-                      <a:endParaRPr lang="es-PE" sz="1000" b="0" i="0" u="none" strike="noStrike" dirty="0">
-                        <a:solidFill>
-                          <a:srgbClr val="000000"/>
-                        </a:solidFill>
-                        <a:effectLst/>
-                        <a:latin typeface="Arial Narrow" panose="020B0606020202030204" pitchFamily="34" charset="0"/>
-                      </a:endParaRPr>
-                    </a:p>
-                  </a:txBody>
-                  <a:tcPr marL="6772" marR="6772" marT="6772" marB="0" anchor="ctr"/>
-                </a:tc>
-                <a:tc>
-                  <a:txBody>
-                    <a:bodyPr/>
-                    <a:lstStyle/>
-                    <a:p>
-                      <a:pPr algn="ctr" rtl="0" fontAlgn="ctr"/>
-                      <a:r>
-                        <a:rPr lang="es-PE" sz="1000" b="0" i="0" u="none" strike="noStrike" dirty="0">
-                          <a:solidFill>
-                            <a:srgbClr val="000000"/>
-                          </a:solidFill>
-                          <a:effectLst/>
-                          <a:latin typeface="Arial Narrow" panose="020B0606020202030204" pitchFamily="34" charset="0"/>
-                        </a:rPr>
                         <a:t>108789</a:t>
                       </a:r>
-                    </a:p>
-                  </a:txBody>
-                  <a:tcPr marL="6772" marR="6772" marT="6772" marB="0" anchor="ctr"/>
-                </a:tc>
-                <a:tc>
-                  <a:txBody>
-                    <a:bodyPr/>
-                    <a:lstStyle/>
-                    <a:p>
-                      <a:pPr marL="0" marR="0" lvl="0" indent="0" algn="l" defTabSz="914400" rtl="0" eaLnBrk="1" fontAlgn="ctr" latinLnBrk="0" hangingPunct="1">
-                        <a:lnSpc>
-                          <a:spcPct val="100000"/>
-                        </a:lnSpc>
-                        <a:spcBef>
-                          <a:spcPts val="0"/>
-                        </a:spcBef>
-                        <a:spcAft>
-                          <a:spcPts val="0"/>
-                        </a:spcAft>
-                        <a:buClrTx/>
-                        <a:buSzTx/>
-                        <a:buFontTx/>
-                        <a:buNone/>
-                        <a:tabLst/>
-                        <a:defRPr/>
-                      </a:pPr>
-                      <a:r>
-                        <a:rPr lang="es-PE" sz="1000" b="0" i="0" u="none" strike="noStrike" dirty="0" err="1">
-                          <a:solidFill>
-                            <a:srgbClr val="000000"/>
-                          </a:solidFill>
-                          <a:effectLst/>
-                          <a:highlight>
-                            <a:srgbClr val="FF0000"/>
-                          </a:highlight>
-                          <a:latin typeface="Arial Narrow" panose="020B0606020202030204" pitchFamily="34" charset="0"/>
-                        </a:rPr>
-                        <a:t>Educacion</a:t>
-                      </a:r>
-                      <a:endParaRPr lang="es-PE" sz="1000" b="0" i="0" u="none" strike="noStrike" dirty="0">
-                        <a:solidFill>
-                          <a:srgbClr val="000000"/>
-                        </a:solidFill>
-                        <a:effectLst/>
-                        <a:highlight>
-                          <a:srgbClr val="FF0000"/>
-                        </a:highlight>
-                        <a:latin typeface="Arial Narrow" panose="020B0606020202030204" pitchFamily="34" charset="0"/>
-                      </a:endParaRPr>
-                    </a:p>
-                    <a:p>
-                      <a:pPr algn="l" rtl="0" fontAlgn="ctr"/>
-                      <a:endParaRPr lang="es-PE" sz="1000" b="0" i="0" u="none" strike="noStrike" dirty="0">
-                        <a:solidFill>
-                          <a:srgbClr val="000000"/>
-                        </a:solidFill>
-                        <a:effectLst/>
-                        <a:highlight>
-                          <a:srgbClr val="FF0000"/>
-                        </a:highlight>
-                        <a:latin typeface="Arial Narrow" panose="020B0606020202030204" pitchFamily="34" charset="0"/>
-                      </a:endParaRPr>
                     </a:p>
                   </a:txBody>
                   <a:tcPr marL="6772" marR="6772" marT="6772" marB="0" anchor="ctr"/>
@@ -9670,23 +8821,7 @@
                     <a:bodyPr/>
                     <a:lstStyle/>
                     <a:p>
-                      <a:pPr marL="0" marR="0" lvl="0" indent="0" algn="ctr" defTabSz="914400" rtl="0" eaLnBrk="1" fontAlgn="ctr" latinLnBrk="0" hangingPunct="1">
-                        <a:lnSpc>
-                          <a:spcPct val="100000"/>
-                        </a:lnSpc>
-                        <a:spcBef>
-                          <a:spcPts val="0"/>
-                        </a:spcBef>
-                        <a:spcAft>
-                          <a:spcPts val="0"/>
-                        </a:spcAft>
-                        <a:buClrTx/>
-                        <a:buSzTx/>
-                        <a:buFontTx/>
-                        <a:buNone/>
-                        <a:tabLst/>
-                        <a:defRPr/>
-                      </a:pPr>
+                      <a:pPr algn="ctr" rtl="0" fontAlgn="ctr"/>
                       <a:r>
                         <a:rPr lang="es-PE" sz="1000" b="0" i="0" u="none" strike="noStrike" dirty="0">
                           <a:solidFill>
@@ -9695,100 +8830,8 @@
                           <a:effectLst/>
                           <a:latin typeface="Arial Narrow" panose="020B0606020202030204" pitchFamily="34" charset="0"/>
                         </a:rPr>
-                        <a:t>----</a:t>
-                      </a:r>
-                    </a:p>
-                    <a:p>
-                      <a:pPr algn="ctr" rtl="0" fontAlgn="ctr"/>
-                      <a:endParaRPr lang="es-PE" sz="1000" b="0" i="0" u="none" strike="noStrike" dirty="0">
-                        <a:solidFill>
-                          <a:srgbClr val="000000"/>
-                        </a:solidFill>
-                        <a:effectLst/>
-                        <a:latin typeface="Arial Narrow" panose="020B0606020202030204" pitchFamily="34" charset="0"/>
-                      </a:endParaRPr>
-                    </a:p>
-                  </a:txBody>
-                  <a:tcPr marL="6772" marR="6772" marT="6772" marB="0" anchor="ctr"/>
-                </a:tc>
-                <a:tc>
-                  <a:txBody>
-                    <a:bodyPr/>
-                    <a:lstStyle/>
-                    <a:p>
-                      <a:pPr algn="ctr" rtl="0" fontAlgn="ctr"/>
-                      <a:r>
-                        <a:rPr lang="es-PE" sz="1000" b="0" i="0" u="none" strike="noStrike" dirty="0">
-                          <a:solidFill>
-                            <a:srgbClr val="000000"/>
-                          </a:solidFill>
-                          <a:effectLst/>
-                          <a:latin typeface="Arial Narrow" panose="020B0606020202030204" pitchFamily="34" charset="0"/>
-                        </a:rPr>
                         <a:t>108798</a:t>
                       </a:r>
-                    </a:p>
-                  </a:txBody>
-                  <a:tcPr marL="6772" marR="6772" marT="6772" marB="0" anchor="ctr"/>
-                </a:tc>
-                <a:tc>
-                  <a:txBody>
-                    <a:bodyPr/>
-                    <a:lstStyle/>
-                    <a:p>
-                      <a:pPr marL="0" marR="0" lvl="0" indent="0" algn="l" defTabSz="914400" rtl="0" eaLnBrk="1" fontAlgn="ctr" latinLnBrk="0" hangingPunct="1">
-                        <a:lnSpc>
-                          <a:spcPct val="100000"/>
-                        </a:lnSpc>
-                        <a:spcBef>
-                          <a:spcPts val="0"/>
-                        </a:spcBef>
-                        <a:spcAft>
-                          <a:spcPts val="0"/>
-                        </a:spcAft>
-                        <a:buClrTx/>
-                        <a:buSzTx/>
-                        <a:buFontTx/>
-                        <a:buNone/>
-                        <a:tabLst/>
-                        <a:defRPr/>
-                      </a:pPr>
-                      <a:r>
-                        <a:rPr lang="es-PE" sz="1000" b="0" i="0" u="none" strike="noStrike" dirty="0" err="1">
-                          <a:solidFill>
-                            <a:srgbClr val="000000"/>
-                          </a:solidFill>
-                          <a:effectLst/>
-                          <a:highlight>
-                            <a:srgbClr val="FF0000"/>
-                          </a:highlight>
-                          <a:latin typeface="Arial Narrow" panose="020B0606020202030204" pitchFamily="34" charset="0"/>
-                        </a:rPr>
-                        <a:t>Educacion</a:t>
-                      </a:r>
-                      <a:endParaRPr lang="es-PE" sz="1000" b="0" i="0" u="none" strike="noStrike" dirty="0">
-                        <a:solidFill>
-                          <a:srgbClr val="000000"/>
-                        </a:solidFill>
-                        <a:effectLst/>
-                        <a:highlight>
-                          <a:srgbClr val="FF0000"/>
-                        </a:highlight>
-                        <a:latin typeface="Arial Narrow" panose="020B0606020202030204" pitchFamily="34" charset="0"/>
-                      </a:endParaRPr>
-                    </a:p>
-                    <a:p>
-                      <a:pPr algn="l" rtl="0" fontAlgn="ctr"/>
-                      <a:endParaRPr lang="es-PE" sz="1000" b="0" i="0" u="none" strike="noStrike" dirty="0">
-                        <a:solidFill>
-                          <a:srgbClr val="000000"/>
-                        </a:solidFill>
-                        <a:effectLst/>
-                        <a:highlight>
-                          <a:srgbClr val="FF0000"/>
-                        </a:highlight>
-                        <a:latin typeface="Arial Narrow" panose="020B0606020202030204" pitchFamily="34" charset="0"/>
-                      </a:endParaRPr>
                     </a:p>
                   </a:txBody>
                   <a:tcPr marL="6772" marR="6772" marT="6772" marB="0" anchor="ctr"/>

</xml_diff>